<commit_message>
add updated dashboard slide
</commit_message>
<xml_diff>
--- a/ppt/theBigGreen_draft.pptx
+++ b/ppt/theBigGreen_draft.pptx
@@ -7252,8 +7252,8 @@
         </p:nvSpPr>
         <p:spPr>
           <a:xfrm>
-            <a:off x="3575275" y="658023"/>
-            <a:ext cx="5108760" cy="3977228"/>
+            <a:off x="3643423" y="658023"/>
+            <a:ext cx="3657600" cy="3977228"/>
           </a:xfrm>
           <a:custGeom>
             <a:avLst/>
@@ -7829,10 +7829,10 @@
       </p:sp>
       <p:pic>
         <p:nvPicPr>
-          <p:cNvPr id="2" name="Picture 1">
+          <p:cNvPr id="4" name="Picture 3">
             <a:extLst>
               <a:ext uri="{FF2B5EF4-FFF2-40B4-BE49-F238E27FC236}">
-                <a16:creationId xmlns:a16="http://schemas.microsoft.com/office/drawing/2014/main" id="{4A07EC2F-E1F5-445D-8C45-154CEA81CE85}"/>
+                <a16:creationId xmlns:a16="http://schemas.microsoft.com/office/drawing/2014/main" id="{B2BB455B-F1FC-47B8-A229-AACBAA6E0E0E}"/>
               </a:ext>
             </a:extLst>
           </p:cNvPr>
@@ -7849,8 +7849,8 @@
         </p:blipFill>
         <p:spPr>
           <a:xfrm>
-            <a:off x="3784798" y="869237"/>
-            <a:ext cx="4695786" cy="2989200"/>
+            <a:off x="3789065" y="869237"/>
+            <a:ext cx="3377280" cy="2989200"/>
           </a:xfrm>
           <a:prstGeom prst="rect">
             <a:avLst/>

</xml_diff>